<commit_message>
added stimulus to poster
</commit_message>
<xml_diff>
--- a/Poster Template Updated 2022.pptx
+++ b/Poster Template Updated 2022.pptx
@@ -3926,7 +3926,7 @@
           </a:lstStyle>
           <a:p>
             <a:r>
-              <a:rPr lang="en-GB" altLang="en-US" sz="6224" b="1" dirty="0" smtClean="0">
+              <a:rPr lang="en-GB" altLang="en-US" sz="6224" b="1" dirty="0">
                 <a:latin typeface="Arial" panose="020B0604020202020204" pitchFamily="34" charset="0"/>
               </a:rPr>
               <a:t>Transformer Learns Neural Circuit with Diverse Stimulation Patterns</a:t>
@@ -4101,13 +4101,13 @@
               </a:spcBef>
             </a:pPr>
             <a:r>
-              <a:rPr lang="en-GB" altLang="en-US" sz="3000" dirty="0" smtClean="0">
+              <a:rPr lang="en-GB" altLang="en-US" sz="3000" dirty="0">
                 <a:latin typeface="Arial" panose="020B0604020202020204" pitchFamily="34" charset="0"/>
               </a:rPr>
               <a:t>To understand the brain, we need to understand the computations performed by neural circuits. </a:t>
             </a:r>
             <a:r>
-              <a:rPr lang="en-GB" altLang="en-US" sz="3000" dirty="0" smtClean="0">
+              <a:rPr lang="en-GB" altLang="en-US" sz="3000" dirty="0">
                 <a:solidFill>
                   <a:srgbClr val="FF7F00"/>
                 </a:solidFill>
@@ -4123,26 +4123,23 @@
               </a:spcBef>
             </a:pPr>
             <a:r>
-              <a:rPr lang="en-GB" altLang="en-US" sz="3000" dirty="0" smtClean="0">
+              <a:rPr lang="en-GB" altLang="en-US" sz="3000" dirty="0">
                 <a:latin typeface="Arial" panose="020B0604020202020204" pitchFamily="34" charset="0"/>
               </a:rPr>
               <a:t>We simultaneously performed all-optical and </a:t>
             </a:r>
             <a:r>
-              <a:rPr lang="en-GB" altLang="en-US" sz="3000" dirty="0" err="1" smtClean="0">
+              <a:rPr lang="en-GB" altLang="en-US" sz="3000" dirty="0" err="1">
                 <a:latin typeface="Arial" panose="020B0604020202020204" pitchFamily="34" charset="0"/>
               </a:rPr>
               <a:t>Neuropixel</a:t>
             </a:r>
             <a:r>
-              <a:rPr lang="en-GB" altLang="en-US" sz="3000" dirty="0" smtClean="0">
+              <a:rPr lang="en-GB" altLang="en-US" sz="3000" dirty="0">
                 <a:latin typeface="Arial" panose="020B0604020202020204" pitchFamily="34" charset="0"/>
               </a:rPr>
               <a:t> recordings in two brain areas… We then trained Transformer neural networks on the data pairs.</a:t>
             </a:r>
-            <a:endParaRPr lang="en-GB" altLang="en-US" sz="3000" dirty="0">
-              <a:latin typeface="Arial" panose="020B0604020202020204" pitchFamily="34" charset="0"/>
-            </a:endParaRPr>
           </a:p>
         </p:txBody>
       </p:sp>
@@ -4310,64 +4307,46 @@
               </a:spcBef>
             </a:pPr>
             <a:r>
-              <a:rPr lang="en-US" altLang="en-US" sz="3000" b="1" dirty="0" smtClean="0">
+              <a:rPr lang="en-US" altLang="en-US" sz="3000" b="1" dirty="0">
                 <a:latin typeface="Arial" panose="020B0604020202020204" pitchFamily="34" charset="0"/>
               </a:rPr>
               <a:t>S. Liu</a:t>
             </a:r>
             <a:r>
-              <a:rPr lang="en-US" altLang="en-US" sz="3000" b="1" baseline="30000" dirty="0" smtClean="0">
-                <a:latin typeface="Arial" panose="020B0604020202020204" pitchFamily="34" charset="0"/>
-              </a:rPr>
-              <a:t>1</a:t>
-            </a:r>
-            <a:r>
               <a:rPr lang="en-US" altLang="en-US" sz="3000" b="1" baseline="30000" dirty="0">
                 <a:latin typeface="Arial" panose="020B0604020202020204" pitchFamily="34" charset="0"/>
               </a:rPr>
-              <a:t>*</a:t>
+              <a:t>1*</a:t>
             </a:r>
             <a:r>
               <a:rPr lang="en-US" altLang="en-US" sz="3000" b="1" dirty="0">
                 <a:latin typeface="Arial" panose="020B0604020202020204" pitchFamily="34" charset="0"/>
               </a:rPr>
-              <a:t>; </a:t>
-            </a:r>
-            <a:r>
-              <a:rPr lang="en-US" altLang="en-US" sz="3000" b="1" dirty="0" smtClean="0">
-                <a:latin typeface="Arial" panose="020B0604020202020204" pitchFamily="34" charset="0"/>
-              </a:rPr>
-              <a:t>A. Mavor-Parker</a:t>
-            </a:r>
-            <a:r>
-              <a:rPr lang="en-US" altLang="en-US" sz="3000" b="1" baseline="30000" dirty="0" smtClean="0">
+              <a:t>; A. Mavor-Parker</a:t>
+            </a:r>
+            <a:r>
+              <a:rPr lang="en-US" altLang="en-US" sz="3000" b="1" baseline="30000" dirty="0">
                 <a:latin typeface="Arial" panose="020B0604020202020204" pitchFamily="34" charset="0"/>
               </a:rPr>
               <a:t>2,3*</a:t>
             </a:r>
             <a:r>
-              <a:rPr lang="en-US" altLang="en-US" sz="3000" b="1" dirty="0" smtClean="0">
+              <a:rPr lang="en-US" altLang="en-US" sz="3000" b="1" dirty="0">
                 <a:latin typeface="Arial" panose="020B0604020202020204" pitchFamily="34" charset="0"/>
               </a:rPr>
               <a:t>; E. </a:t>
             </a:r>
             <a:r>
-              <a:rPr lang="en-US" altLang="en-US" sz="3000" b="1" dirty="0" err="1" smtClean="0">
+              <a:rPr lang="en-US" altLang="en-US" sz="3000" b="1" dirty="0" err="1">
                 <a:latin typeface="Arial" panose="020B0604020202020204" pitchFamily="34" charset="0"/>
               </a:rPr>
               <a:t>Baumler</a:t>
             </a:r>
             <a:r>
-              <a:rPr lang="en-US" altLang="en-US" sz="3000" b="1" dirty="0" smtClean="0">
-                <a:latin typeface="Arial" panose="020B0604020202020204" pitchFamily="34" charset="0"/>
-              </a:rPr>
-              <a:t>; M. Buchholz </a:t>
-            </a:r>
-            <a:r>
               <a:rPr lang="en-US" altLang="en-US" sz="3000" b="1" dirty="0">
                 <a:latin typeface="Arial" panose="020B0604020202020204" pitchFamily="34" charset="0"/>
               </a:rPr>
-              <a:t>&amp; C.Barry</a:t>
+              <a:t>; M. Buchholz &amp; C.Barry</a:t>
             </a:r>
             <a:r>
               <a:rPr lang="en-US" altLang="en-US" sz="3000" b="1" baseline="30000" dirty="0">
@@ -4614,22 +4593,10 @@
               <a:rPr lang="en-US" altLang="en-US" sz="2600" dirty="0">
                 <a:latin typeface="Arial" panose="020B0604020202020204" pitchFamily="34" charset="0"/>
               </a:rPr>
-              <a:t>* Equal contribution. </a:t>
-            </a:r>
-            <a:r>
+              <a:t>* Equal contribution. Correspondence to first.author@ucl.ac.uk or caswell.barry@ucl.ac.uk </a:t>
+            </a:r>
+            <a:br>
               <a:rPr lang="en-US" altLang="en-US" sz="2600" dirty="0">
-                <a:latin typeface="Arial" panose="020B0604020202020204" pitchFamily="34" charset="0"/>
-              </a:rPr>
-              <a:t>Correspondence to first.author@ucl.ac.uk or caswell.barry@ucl.ac.uk </a:t>
-            </a:r>
-            <a:r>
-              <a:rPr lang="en-US" altLang="en-US" sz="2600" dirty="0" smtClean="0">
-                <a:latin typeface="Arial" panose="020B0604020202020204" pitchFamily="34" charset="0"/>
-              </a:rPr>
-              <a:t/>
-            </a:r>
-            <a:br>
-              <a:rPr lang="en-US" altLang="en-US" sz="2600" dirty="0" smtClean="0">
                 <a:latin typeface="Arial" panose="020B0604020202020204" pitchFamily="34" charset="0"/>
               </a:rPr>
             </a:br>
@@ -5061,194 +5028,6 @@
       </p:sp>
       <p:sp>
         <p:nvSpPr>
-          <p:cNvPr id="13388" name="Text Box 57">
-            <a:extLst>
-              <a:ext uri="{FF2B5EF4-FFF2-40B4-BE49-F238E27FC236}">
-                <a16:creationId xmlns:a16="http://schemas.microsoft.com/office/drawing/2014/main" id="{F400AABA-347E-734B-A4A3-7A25001CB108}"/>
-              </a:ext>
-            </a:extLst>
-          </p:cNvPr>
-          <p:cNvSpPr txBox="1">
-            <a:spLocks noChangeArrowheads="1"/>
-          </p:cNvSpPr>
-          <p:nvPr/>
-        </p:nvSpPr>
-        <p:spPr bwMode="auto">
-          <a:xfrm>
-            <a:off x="20507603" y="14708054"/>
-            <a:ext cx="8971515" cy="418897"/>
-          </a:xfrm>
-          <a:prstGeom prst="rect">
-            <a:avLst/>
-          </a:prstGeom>
-          <a:noFill/>
-          <a:ln>
-            <a:noFill/>
-          </a:ln>
-          <a:extLst>
-            <a:ext uri="{909E8E84-426E-40DD-AFC4-6F175D3DCCD1}">
-              <a14:hiddenFill xmlns:a14="http://schemas.microsoft.com/office/drawing/2010/main">
-                <a:solidFill>
-                  <a:srgbClr val="FFFFFF"/>
-                </a:solidFill>
-              </a14:hiddenFill>
-            </a:ext>
-            <a:ext uri="{91240B29-F687-4F45-9708-019B960494DF}">
-              <a14:hiddenLine xmlns:a14="http://schemas.microsoft.com/office/drawing/2010/main" w="9525">
-                <a:solidFill>
-                  <a:srgbClr val="000000"/>
-                </a:solidFill>
-                <a:miter lim="800000"/>
-                <a:headEnd/>
-                <a:tailEnd/>
-              </a14:hiddenLine>
-            </a:ext>
-          </a:extLst>
-        </p:spPr>
-        <p:txBody>
-          <a:bodyPr>
-            <a:spAutoFit/>
-          </a:bodyPr>
-          <a:lstStyle>
-            <a:lvl1pPr eaLnBrk="0" hangingPunct="0">
-              <a:defRPr sz="2400">
-                <a:solidFill>
-                  <a:schemeClr val="tx1"/>
-                </a:solidFill>
-                <a:latin typeface="Times" pitchFamily="2" charset="0"/>
-                <a:ea typeface="ＭＳ Ｐゴシック" panose="020B0600070205080204" pitchFamily="34" charset="-128"/>
-              </a:defRPr>
-            </a:lvl1pPr>
-            <a:lvl2pPr marL="742950" indent="-285750" eaLnBrk="0" hangingPunct="0">
-              <a:defRPr sz="2400">
-                <a:solidFill>
-                  <a:schemeClr val="tx1"/>
-                </a:solidFill>
-                <a:latin typeface="Times" pitchFamily="2" charset="0"/>
-                <a:ea typeface="ＭＳ Ｐゴシック" panose="020B0600070205080204" pitchFamily="34" charset="-128"/>
-              </a:defRPr>
-            </a:lvl2pPr>
-            <a:lvl3pPr marL="1143000" indent="-228600" eaLnBrk="0" hangingPunct="0">
-              <a:defRPr sz="2400">
-                <a:solidFill>
-                  <a:schemeClr val="tx1"/>
-                </a:solidFill>
-                <a:latin typeface="Times" pitchFamily="2" charset="0"/>
-                <a:ea typeface="ＭＳ Ｐゴシック" panose="020B0600070205080204" pitchFamily="34" charset="-128"/>
-              </a:defRPr>
-            </a:lvl3pPr>
-            <a:lvl4pPr marL="1600200" indent="-228600" eaLnBrk="0" hangingPunct="0">
-              <a:defRPr sz="2400">
-                <a:solidFill>
-                  <a:schemeClr val="tx1"/>
-                </a:solidFill>
-                <a:latin typeface="Times" pitchFamily="2" charset="0"/>
-                <a:ea typeface="ＭＳ Ｐゴシック" panose="020B0600070205080204" pitchFamily="34" charset="-128"/>
-              </a:defRPr>
-            </a:lvl4pPr>
-            <a:lvl5pPr marL="2057400" indent="-228600" eaLnBrk="0" hangingPunct="0">
-              <a:defRPr sz="2400">
-                <a:solidFill>
-                  <a:schemeClr val="tx1"/>
-                </a:solidFill>
-                <a:latin typeface="Times" pitchFamily="2" charset="0"/>
-                <a:ea typeface="ＭＳ Ｐゴシック" panose="020B0600070205080204" pitchFamily="34" charset="-128"/>
-              </a:defRPr>
-            </a:lvl5pPr>
-            <a:lvl6pPr marL="2514600" indent="-228600" eaLnBrk="0" fontAlgn="base" hangingPunct="0">
-              <a:spcBef>
-                <a:spcPct val="0"/>
-              </a:spcBef>
-              <a:spcAft>
-                <a:spcPct val="0"/>
-              </a:spcAft>
-              <a:defRPr sz="2400">
-                <a:solidFill>
-                  <a:schemeClr val="tx1"/>
-                </a:solidFill>
-                <a:latin typeface="Times" pitchFamily="2" charset="0"/>
-                <a:ea typeface="ＭＳ Ｐゴシック" panose="020B0600070205080204" pitchFamily="34" charset="-128"/>
-              </a:defRPr>
-            </a:lvl6pPr>
-            <a:lvl7pPr marL="2971800" indent="-228600" eaLnBrk="0" fontAlgn="base" hangingPunct="0">
-              <a:spcBef>
-                <a:spcPct val="0"/>
-              </a:spcBef>
-              <a:spcAft>
-                <a:spcPct val="0"/>
-              </a:spcAft>
-              <a:defRPr sz="2400">
-                <a:solidFill>
-                  <a:schemeClr val="tx1"/>
-                </a:solidFill>
-                <a:latin typeface="Times" pitchFamily="2" charset="0"/>
-                <a:ea typeface="ＭＳ Ｐゴシック" panose="020B0600070205080204" pitchFamily="34" charset="-128"/>
-              </a:defRPr>
-            </a:lvl7pPr>
-            <a:lvl8pPr marL="3429000" indent="-228600" eaLnBrk="0" fontAlgn="base" hangingPunct="0">
-              <a:spcBef>
-                <a:spcPct val="0"/>
-              </a:spcBef>
-              <a:spcAft>
-                <a:spcPct val="0"/>
-              </a:spcAft>
-              <a:defRPr sz="2400">
-                <a:solidFill>
-                  <a:schemeClr val="tx1"/>
-                </a:solidFill>
-                <a:latin typeface="Times" pitchFamily="2" charset="0"/>
-                <a:ea typeface="ＭＳ Ｐゴシック" panose="020B0600070205080204" pitchFamily="34" charset="-128"/>
-              </a:defRPr>
-            </a:lvl8pPr>
-            <a:lvl9pPr marL="3886200" indent="-228600" eaLnBrk="0" fontAlgn="base" hangingPunct="0">
-              <a:spcBef>
-                <a:spcPct val="0"/>
-              </a:spcBef>
-              <a:spcAft>
-                <a:spcPct val="0"/>
-              </a:spcAft>
-              <a:defRPr sz="2400">
-                <a:solidFill>
-                  <a:schemeClr val="tx1"/>
-                </a:solidFill>
-                <a:latin typeface="Times" pitchFamily="2" charset="0"/>
-                <a:ea typeface="ＭＳ Ｐゴシック" panose="020B0600070205080204" pitchFamily="34" charset="-128"/>
-              </a:defRPr>
-            </a:lvl9pPr>
-          </a:lstStyle>
-          <a:p>
-            <a:pPr>
-              <a:spcBef>
-                <a:spcPct val="50000"/>
-              </a:spcBef>
-            </a:pPr>
-            <a:r>
-              <a:rPr lang="en-GB" altLang="en-US" sz="2122" b="1" dirty="0">
-                <a:solidFill>
-                  <a:srgbClr val="FF7F00"/>
-                </a:solidFill>
-                <a:latin typeface="Arial" panose="020B0604020202020204" pitchFamily="34" charset="0"/>
-              </a:rPr>
-              <a:t>Numerous neural implementations are possible</a:t>
-            </a:r>
-            <a:r>
-              <a:rPr lang="en-GB" altLang="en-US" sz="2122" b="1" dirty="0">
-                <a:solidFill>
-                  <a:srgbClr val="0099CC"/>
-                </a:solidFill>
-                <a:latin typeface="Arial" panose="020B0604020202020204" pitchFamily="34" charset="0"/>
-              </a:rPr>
-              <a:t> </a:t>
-            </a:r>
-            <a:endParaRPr lang="en-GB" altLang="en-US" sz="2122" baseline="-25000" dirty="0">
-              <a:latin typeface="Arial" panose="020B0604020202020204" pitchFamily="34" charset="0"/>
-              <a:cs typeface="Arial" panose="020B0604020202020204" pitchFamily="34" charset="0"/>
-            </a:endParaRPr>
-          </a:p>
-        </p:txBody>
-      </p:sp>
-      <p:sp>
-        <p:nvSpPr>
           <p:cNvPr id="59" name="Rounded Rectangle 58">
             <a:extLst>
               <a:ext uri="{FF2B5EF4-FFF2-40B4-BE49-F238E27FC236}">
@@ -5460,7 +5239,7 @@
               </a:spcBef>
             </a:pPr>
             <a:r>
-              <a:rPr lang="en-GB" altLang="en-US" sz="2122" b="1" dirty="0" smtClean="0">
+              <a:rPr lang="en-GB" altLang="en-US" sz="2122" b="1" dirty="0">
                 <a:solidFill>
                   <a:srgbClr val="FF7F00"/>
                 </a:solidFill>
@@ -5468,1135 +5247,9 @@
               </a:rPr>
               <a:t>Conclusions</a:t>
             </a:r>
-            <a:endParaRPr lang="en-GB" altLang="en-US" sz="2122" b="1" dirty="0">
-              <a:solidFill>
-                <a:srgbClr val="FF7F00"/>
-              </a:solidFill>
-              <a:latin typeface="Arial" panose="020B0604020202020204" pitchFamily="34" charset="0"/>
-            </a:endParaRPr>
-          </a:p>
-        </p:txBody>
-      </p:sp>
-      <p:sp>
-        <p:nvSpPr>
-          <p:cNvPr id="13391" name="Text Box 57">
-            <a:extLst>
-              <a:ext uri="{FF2B5EF4-FFF2-40B4-BE49-F238E27FC236}">
-                <a16:creationId xmlns:a16="http://schemas.microsoft.com/office/drawing/2014/main" id="{B0B3FCE3-2E23-294F-A69A-89120B110E2F}"/>
-              </a:ext>
-            </a:extLst>
-          </p:cNvPr>
-          <p:cNvSpPr txBox="1">
-            <a:spLocks noChangeArrowheads="1"/>
-          </p:cNvSpPr>
-          <p:nvPr/>
-        </p:nvSpPr>
-        <p:spPr bwMode="auto">
-          <a:xfrm>
-            <a:off x="20432373" y="15202105"/>
-            <a:ext cx="8971515" cy="418897"/>
-          </a:xfrm>
-          <a:prstGeom prst="rect">
-            <a:avLst/>
-          </a:prstGeom>
-          <a:noFill/>
-          <a:ln>
-            <a:noFill/>
-          </a:ln>
-          <a:extLst>
-            <a:ext uri="{909E8E84-426E-40DD-AFC4-6F175D3DCCD1}">
-              <a14:hiddenFill xmlns:a14="http://schemas.microsoft.com/office/drawing/2010/main">
-                <a:solidFill>
-                  <a:srgbClr val="FFFFFF"/>
-                </a:solidFill>
-              </a14:hiddenFill>
-            </a:ext>
-            <a:ext uri="{91240B29-F687-4F45-9708-019B960494DF}">
-              <a14:hiddenLine xmlns:a14="http://schemas.microsoft.com/office/drawing/2010/main" w="9525">
-                <a:solidFill>
-                  <a:srgbClr val="000000"/>
-                </a:solidFill>
-                <a:miter lim="800000"/>
-                <a:headEnd/>
-                <a:tailEnd/>
-              </a14:hiddenLine>
-            </a:ext>
-          </a:extLst>
-        </p:spPr>
-        <p:txBody>
-          <a:bodyPr>
-            <a:spAutoFit/>
-          </a:bodyPr>
-          <a:lstStyle>
-            <a:lvl1pPr eaLnBrk="0" hangingPunct="0">
-              <a:defRPr sz="2400">
-                <a:solidFill>
-                  <a:schemeClr val="tx1"/>
-                </a:solidFill>
-                <a:latin typeface="Times" pitchFamily="2" charset="0"/>
-                <a:ea typeface="ＭＳ Ｐゴシック" panose="020B0600070205080204" pitchFamily="34" charset="-128"/>
-              </a:defRPr>
-            </a:lvl1pPr>
-            <a:lvl2pPr marL="742950" indent="-285750" eaLnBrk="0" hangingPunct="0">
-              <a:defRPr sz="2400">
-                <a:solidFill>
-                  <a:schemeClr val="tx1"/>
-                </a:solidFill>
-                <a:latin typeface="Times" pitchFamily="2" charset="0"/>
-                <a:ea typeface="ＭＳ Ｐゴシック" panose="020B0600070205080204" pitchFamily="34" charset="-128"/>
-              </a:defRPr>
-            </a:lvl2pPr>
-            <a:lvl3pPr marL="1143000" indent="-228600" eaLnBrk="0" hangingPunct="0">
-              <a:defRPr sz="2400">
-                <a:solidFill>
-                  <a:schemeClr val="tx1"/>
-                </a:solidFill>
-                <a:latin typeface="Times" pitchFamily="2" charset="0"/>
-                <a:ea typeface="ＭＳ Ｐゴシック" panose="020B0600070205080204" pitchFamily="34" charset="-128"/>
-              </a:defRPr>
-            </a:lvl3pPr>
-            <a:lvl4pPr marL="1600200" indent="-228600" eaLnBrk="0" hangingPunct="0">
-              <a:defRPr sz="2400">
-                <a:solidFill>
-                  <a:schemeClr val="tx1"/>
-                </a:solidFill>
-                <a:latin typeface="Times" pitchFamily="2" charset="0"/>
-                <a:ea typeface="ＭＳ Ｐゴシック" panose="020B0600070205080204" pitchFamily="34" charset="-128"/>
-              </a:defRPr>
-            </a:lvl4pPr>
-            <a:lvl5pPr marL="2057400" indent="-228600" eaLnBrk="0" hangingPunct="0">
-              <a:defRPr sz="2400">
-                <a:solidFill>
-                  <a:schemeClr val="tx1"/>
-                </a:solidFill>
-                <a:latin typeface="Times" pitchFamily="2" charset="0"/>
-                <a:ea typeface="ＭＳ Ｐゴシック" panose="020B0600070205080204" pitchFamily="34" charset="-128"/>
-              </a:defRPr>
-            </a:lvl5pPr>
-            <a:lvl6pPr marL="2514600" indent="-228600" eaLnBrk="0" fontAlgn="base" hangingPunct="0">
-              <a:spcBef>
-                <a:spcPct val="0"/>
-              </a:spcBef>
-              <a:spcAft>
-                <a:spcPct val="0"/>
-              </a:spcAft>
-              <a:defRPr sz="2400">
-                <a:solidFill>
-                  <a:schemeClr val="tx1"/>
-                </a:solidFill>
-                <a:latin typeface="Times" pitchFamily="2" charset="0"/>
-                <a:ea typeface="ＭＳ Ｐゴシック" panose="020B0600070205080204" pitchFamily="34" charset="-128"/>
-              </a:defRPr>
-            </a:lvl6pPr>
-            <a:lvl7pPr marL="2971800" indent="-228600" eaLnBrk="0" fontAlgn="base" hangingPunct="0">
-              <a:spcBef>
-                <a:spcPct val="0"/>
-              </a:spcBef>
-              <a:spcAft>
-                <a:spcPct val="0"/>
-              </a:spcAft>
-              <a:defRPr sz="2400">
-                <a:solidFill>
-                  <a:schemeClr val="tx1"/>
-                </a:solidFill>
-                <a:latin typeface="Times" pitchFamily="2" charset="0"/>
-                <a:ea typeface="ＭＳ Ｐゴシック" panose="020B0600070205080204" pitchFamily="34" charset="-128"/>
-              </a:defRPr>
-            </a:lvl7pPr>
-            <a:lvl8pPr marL="3429000" indent="-228600" eaLnBrk="0" fontAlgn="base" hangingPunct="0">
-              <a:spcBef>
-                <a:spcPct val="0"/>
-              </a:spcBef>
-              <a:spcAft>
-                <a:spcPct val="0"/>
-              </a:spcAft>
-              <a:defRPr sz="2400">
-                <a:solidFill>
-                  <a:schemeClr val="tx1"/>
-                </a:solidFill>
-                <a:latin typeface="Times" pitchFamily="2" charset="0"/>
-                <a:ea typeface="ＭＳ Ｐゴシック" panose="020B0600070205080204" pitchFamily="34" charset="-128"/>
-              </a:defRPr>
-            </a:lvl8pPr>
-            <a:lvl9pPr marL="3886200" indent="-228600" eaLnBrk="0" fontAlgn="base" hangingPunct="0">
-              <a:spcBef>
-                <a:spcPct val="0"/>
-              </a:spcBef>
-              <a:spcAft>
-                <a:spcPct val="0"/>
-              </a:spcAft>
-              <a:defRPr sz="2400">
-                <a:solidFill>
-                  <a:schemeClr val="tx1"/>
-                </a:solidFill>
-                <a:latin typeface="Times" pitchFamily="2" charset="0"/>
-                <a:ea typeface="ＭＳ Ｐゴシック" panose="020B0600070205080204" pitchFamily="34" charset="-128"/>
-              </a:defRPr>
-            </a:lvl9pPr>
-          </a:lstStyle>
-          <a:p>
-            <a:pPr algn="just">
-              <a:spcBef>
-                <a:spcPct val="50000"/>
-              </a:spcBef>
-            </a:pPr>
-            <a:r>
-              <a:rPr lang="en-GB" altLang="en-US" sz="2122" b="1" dirty="0">
-                <a:solidFill>
-                  <a:srgbClr val="FF7F00"/>
-                </a:solidFill>
-                <a:latin typeface="Arial" panose="020B0604020202020204" pitchFamily="34" charset="0"/>
-              </a:rPr>
-              <a:t>1. Distance cell model</a:t>
-            </a:r>
-          </a:p>
-        </p:txBody>
-      </p:sp>
-      <p:sp>
-        <p:nvSpPr>
-          <p:cNvPr id="13392" name="Text Box 57">
-            <a:extLst>
-              <a:ext uri="{FF2B5EF4-FFF2-40B4-BE49-F238E27FC236}">
-                <a16:creationId xmlns:a16="http://schemas.microsoft.com/office/drawing/2014/main" id="{28CC4D3A-F7C3-9547-B355-BFDC36874896}"/>
-              </a:ext>
-            </a:extLst>
-          </p:cNvPr>
-          <p:cNvSpPr txBox="1">
-            <a:spLocks noChangeArrowheads="1"/>
-          </p:cNvSpPr>
-          <p:nvPr/>
-        </p:nvSpPr>
-        <p:spPr bwMode="auto">
-          <a:xfrm>
-            <a:off x="20432372" y="18640250"/>
-            <a:ext cx="5208868" cy="3684535"/>
-          </a:xfrm>
-          <a:prstGeom prst="rect">
-            <a:avLst/>
-          </a:prstGeom>
-          <a:noFill/>
-          <a:ln>
-            <a:noFill/>
-          </a:ln>
-          <a:extLst>
-            <a:ext uri="{909E8E84-426E-40DD-AFC4-6F175D3DCCD1}">
-              <a14:hiddenFill xmlns:a14="http://schemas.microsoft.com/office/drawing/2010/main">
-                <a:solidFill>
-                  <a:srgbClr val="FFFFFF"/>
-                </a:solidFill>
-              </a14:hiddenFill>
-            </a:ext>
-            <a:ext uri="{91240B29-F687-4F45-9708-019B960494DF}">
-              <a14:hiddenLine xmlns:a14="http://schemas.microsoft.com/office/drawing/2010/main" w="9525">
-                <a:solidFill>
-                  <a:srgbClr val="000000"/>
-                </a:solidFill>
-                <a:miter lim="800000"/>
-                <a:headEnd/>
-                <a:tailEnd/>
-              </a14:hiddenLine>
-            </a:ext>
-          </a:extLst>
-        </p:spPr>
-        <p:txBody>
-          <a:bodyPr>
-            <a:spAutoFit/>
-          </a:bodyPr>
-          <a:lstStyle>
-            <a:lvl1pPr eaLnBrk="0" hangingPunct="0">
-              <a:defRPr sz="2400">
-                <a:solidFill>
-                  <a:schemeClr val="tx1"/>
-                </a:solidFill>
-                <a:latin typeface="Times" pitchFamily="2" charset="0"/>
-                <a:ea typeface="ＭＳ Ｐゴシック" panose="020B0600070205080204" pitchFamily="34" charset="-128"/>
-              </a:defRPr>
-            </a:lvl1pPr>
-            <a:lvl2pPr marL="742950" indent="-285750" eaLnBrk="0" hangingPunct="0">
-              <a:defRPr sz="2400">
-                <a:solidFill>
-                  <a:schemeClr val="tx1"/>
-                </a:solidFill>
-                <a:latin typeface="Times" pitchFamily="2" charset="0"/>
-                <a:ea typeface="ＭＳ Ｐゴシック" panose="020B0600070205080204" pitchFamily="34" charset="-128"/>
-              </a:defRPr>
-            </a:lvl2pPr>
-            <a:lvl3pPr marL="1143000" indent="-228600" eaLnBrk="0" hangingPunct="0">
-              <a:defRPr sz="2400">
-                <a:solidFill>
-                  <a:schemeClr val="tx1"/>
-                </a:solidFill>
-                <a:latin typeface="Times" pitchFamily="2" charset="0"/>
-                <a:ea typeface="ＭＳ Ｐゴシック" panose="020B0600070205080204" pitchFamily="34" charset="-128"/>
-              </a:defRPr>
-            </a:lvl3pPr>
-            <a:lvl4pPr marL="1600200" indent="-228600" eaLnBrk="0" hangingPunct="0">
-              <a:defRPr sz="2400">
-                <a:solidFill>
-                  <a:schemeClr val="tx1"/>
-                </a:solidFill>
-                <a:latin typeface="Times" pitchFamily="2" charset="0"/>
-                <a:ea typeface="ＭＳ Ｐゴシック" panose="020B0600070205080204" pitchFamily="34" charset="-128"/>
-              </a:defRPr>
-            </a:lvl4pPr>
-            <a:lvl5pPr marL="2057400" indent="-228600" eaLnBrk="0" hangingPunct="0">
-              <a:defRPr sz="2400">
-                <a:solidFill>
-                  <a:schemeClr val="tx1"/>
-                </a:solidFill>
-                <a:latin typeface="Times" pitchFamily="2" charset="0"/>
-                <a:ea typeface="ＭＳ Ｐゴシック" panose="020B0600070205080204" pitchFamily="34" charset="-128"/>
-              </a:defRPr>
-            </a:lvl5pPr>
-            <a:lvl6pPr marL="2514600" indent="-228600" eaLnBrk="0" fontAlgn="base" hangingPunct="0">
-              <a:spcBef>
-                <a:spcPct val="0"/>
-              </a:spcBef>
-              <a:spcAft>
-                <a:spcPct val="0"/>
-              </a:spcAft>
-              <a:defRPr sz="2400">
-                <a:solidFill>
-                  <a:schemeClr val="tx1"/>
-                </a:solidFill>
-                <a:latin typeface="Times" pitchFamily="2" charset="0"/>
-                <a:ea typeface="ＭＳ Ｐゴシック" panose="020B0600070205080204" pitchFamily="34" charset="-128"/>
-              </a:defRPr>
-            </a:lvl6pPr>
-            <a:lvl7pPr marL="2971800" indent="-228600" eaLnBrk="0" fontAlgn="base" hangingPunct="0">
-              <a:spcBef>
-                <a:spcPct val="0"/>
-              </a:spcBef>
-              <a:spcAft>
-                <a:spcPct val="0"/>
-              </a:spcAft>
-              <a:defRPr sz="2400">
-                <a:solidFill>
-                  <a:schemeClr val="tx1"/>
-                </a:solidFill>
-                <a:latin typeface="Times" pitchFamily="2" charset="0"/>
-                <a:ea typeface="ＭＳ Ｐゴシック" panose="020B0600070205080204" pitchFamily="34" charset="-128"/>
-              </a:defRPr>
-            </a:lvl7pPr>
-            <a:lvl8pPr marL="3429000" indent="-228600" eaLnBrk="0" fontAlgn="base" hangingPunct="0">
-              <a:spcBef>
-                <a:spcPct val="0"/>
-              </a:spcBef>
-              <a:spcAft>
-                <a:spcPct val="0"/>
-              </a:spcAft>
-              <a:defRPr sz="2400">
-                <a:solidFill>
-                  <a:schemeClr val="tx1"/>
-                </a:solidFill>
-                <a:latin typeface="Times" pitchFamily="2" charset="0"/>
-                <a:ea typeface="ＭＳ Ｐゴシック" panose="020B0600070205080204" pitchFamily="34" charset="-128"/>
-              </a:defRPr>
-            </a:lvl8pPr>
-            <a:lvl9pPr marL="3886200" indent="-228600" eaLnBrk="0" fontAlgn="base" hangingPunct="0">
-              <a:spcBef>
-                <a:spcPct val="0"/>
-              </a:spcBef>
-              <a:spcAft>
-                <a:spcPct val="0"/>
-              </a:spcAft>
-              <a:defRPr sz="2400">
-                <a:solidFill>
-                  <a:schemeClr val="tx1"/>
-                </a:solidFill>
-                <a:latin typeface="Times" pitchFamily="2" charset="0"/>
-                <a:ea typeface="ＭＳ Ｐゴシック" panose="020B0600070205080204" pitchFamily="34" charset="-128"/>
-              </a:defRPr>
-            </a:lvl9pPr>
-          </a:lstStyle>
-          <a:p>
-            <a:pPr algn="just">
-              <a:spcBef>
-                <a:spcPct val="50000"/>
-              </a:spcBef>
-            </a:pPr>
-            <a:r>
-              <a:rPr lang="en-GB" altLang="en-US" sz="2122" dirty="0">
-                <a:solidFill>
-                  <a:srgbClr val="000000"/>
-                </a:solidFill>
-                <a:latin typeface="Arial" panose="020B0604020202020204" pitchFamily="34" charset="0"/>
-              </a:rPr>
-              <a:t>‘Distance cells’ encode displacements </a:t>
-            </a:r>
-            <a:r>
-              <a:rPr lang="en-GB" altLang="en-US" sz="2122" i="1" dirty="0">
-                <a:solidFill>
-                  <a:srgbClr val="000000"/>
-                </a:solidFill>
-                <a:latin typeface="Arial" panose="020B0604020202020204" pitchFamily="34" charset="0"/>
-              </a:rPr>
-              <a:t>d</a:t>
-            </a:r>
-            <a:r>
-              <a:rPr lang="en-GB" altLang="en-US" sz="2122" i="1" baseline="-25000" dirty="0">
-                <a:solidFill>
-                  <a:srgbClr val="000000"/>
-                </a:solidFill>
-                <a:latin typeface="Arial" panose="020B0604020202020204" pitchFamily="34" charset="0"/>
-              </a:rPr>
-              <a:t>x</a:t>
-            </a:r>
-            <a:r>
-              <a:rPr lang="en-GB" altLang="en-US" sz="2122" dirty="0">
-                <a:solidFill>
-                  <a:srgbClr val="000000"/>
-                </a:solidFill>
-                <a:latin typeface="Arial" panose="020B0604020202020204" pitchFamily="34" charset="0"/>
-              </a:rPr>
-              <a:t> along a single axis. Each distance cell receives input from grid cells of all modules proportional to their firing rate at that position on the axis. Distance cells provide input to a single read-out cell with weights proportional to distance along the axis. </a:t>
-            </a:r>
-            <a:r>
-              <a:rPr lang="en-GB" altLang="en-US" sz="2122" i="1" dirty="0">
-                <a:solidFill>
-                  <a:srgbClr val="000000"/>
-                </a:solidFill>
-                <a:latin typeface="Arial" panose="020B0604020202020204" pitchFamily="34" charset="0"/>
-              </a:rPr>
-              <a:t>Start</a:t>
-            </a:r>
-            <a:r>
-              <a:rPr lang="en-GB" altLang="en-US" sz="2122" dirty="0">
-                <a:solidFill>
-                  <a:srgbClr val="000000"/>
-                </a:solidFill>
-                <a:latin typeface="Arial" panose="020B0604020202020204" pitchFamily="34" charset="0"/>
-              </a:rPr>
-              <a:t> and </a:t>
-            </a:r>
-            <a:r>
-              <a:rPr lang="en-GB" altLang="en-US" sz="2122" i="1" dirty="0">
-                <a:solidFill>
-                  <a:srgbClr val="000000"/>
-                </a:solidFill>
-                <a:latin typeface="Arial" panose="020B0604020202020204" pitchFamily="34" charset="0"/>
-              </a:rPr>
-              <a:t>Goal</a:t>
-            </a:r>
-            <a:r>
-              <a:rPr lang="en-GB" altLang="en-US" sz="2122" dirty="0">
-                <a:solidFill>
-                  <a:srgbClr val="000000"/>
-                </a:solidFill>
-                <a:latin typeface="Arial" panose="020B0604020202020204" pitchFamily="34" charset="0"/>
-              </a:rPr>
-              <a:t> locations are compared using two arrays of distance cells </a:t>
-            </a:r>
-            <a:r>
-              <a:rPr lang="en-GB" altLang="en-US" sz="2122" dirty="0" err="1">
-                <a:solidFill>
-                  <a:srgbClr val="000000"/>
-                </a:solidFill>
-                <a:latin typeface="Arial" panose="020B0604020202020204" pitchFamily="34" charset="0"/>
-              </a:rPr>
-              <a:t>opposingly</a:t>
-            </a:r>
-            <a:r>
-              <a:rPr lang="en-GB" altLang="en-US" sz="2122" dirty="0">
-                <a:solidFill>
-                  <a:srgbClr val="000000"/>
-                </a:solidFill>
-                <a:latin typeface="Arial" panose="020B0604020202020204" pitchFamily="34" charset="0"/>
-              </a:rPr>
-              <a:t> connected to two read-out cells</a:t>
-            </a:r>
-            <a:r>
-              <a:rPr lang="en-GB" altLang="en-US" sz="2122" baseline="30000" dirty="0">
-                <a:solidFill>
-                  <a:srgbClr val="000000"/>
-                </a:solidFill>
-                <a:latin typeface="Arial" panose="020B0604020202020204" pitchFamily="34" charset="0"/>
-              </a:rPr>
-              <a:t>5</a:t>
-            </a:r>
-            <a:r>
-              <a:rPr lang="en-GB" altLang="en-US" sz="2122" dirty="0">
-                <a:solidFill>
-                  <a:srgbClr val="000000"/>
-                </a:solidFill>
-                <a:latin typeface="Arial" panose="020B0604020202020204" pitchFamily="34" charset="0"/>
-              </a:rPr>
-              <a:t>.</a:t>
-            </a:r>
-          </a:p>
-        </p:txBody>
-      </p:sp>
-      <p:pic>
-        <p:nvPicPr>
-          <p:cNvPr id="13393" name="Picture 14">
-            <a:extLst>
-              <a:ext uri="{FF2B5EF4-FFF2-40B4-BE49-F238E27FC236}">
-                <a16:creationId xmlns:a16="http://schemas.microsoft.com/office/drawing/2014/main" id="{CAB7C4A3-5C6F-3240-ADB9-6C5FAD43C665}"/>
-              </a:ext>
-            </a:extLst>
-          </p:cNvPr>
-          <p:cNvPicPr>
-            <a:picLocks noChangeAspect="1"/>
-          </p:cNvPicPr>
-          <p:nvPr/>
-        </p:nvPicPr>
-        <p:blipFill>
-          <a:blip r:embed="rId3">
-            <a:extLst>
-              <a:ext uri="{28A0092B-C50C-407E-A947-70E740481C1C}">
-                <a14:useLocalDpi xmlns:a14="http://schemas.microsoft.com/office/drawing/2010/main" val="0"/>
-              </a:ext>
-            </a:extLst>
-          </a:blip>
-          <a:srcRect l="52344"/>
-          <a:stretch>
-            <a:fillRect/>
-          </a:stretch>
-        </p:blipFill>
-        <p:spPr bwMode="auto">
-          <a:xfrm>
-            <a:off x="25817526" y="18462840"/>
-            <a:ext cx="3561658" cy="3584114"/>
-          </a:xfrm>
-          <a:prstGeom prst="rect">
-            <a:avLst/>
-          </a:prstGeom>
-          <a:noFill/>
-          <a:ln>
-            <a:noFill/>
-          </a:ln>
-          <a:extLst>
-            <a:ext uri="{909E8E84-426E-40DD-AFC4-6F175D3DCCD1}">
-              <a14:hiddenFill xmlns:a14="http://schemas.microsoft.com/office/drawing/2010/main">
-                <a:solidFill>
-                  <a:srgbClr val="FFFFFF"/>
-                </a:solidFill>
-              </a14:hiddenFill>
-            </a:ext>
-            <a:ext uri="{91240B29-F687-4F45-9708-019B960494DF}">
-              <a14:hiddenLine xmlns:a14="http://schemas.microsoft.com/office/drawing/2010/main" w="9525">
-                <a:solidFill>
-                  <a:srgbClr val="000000"/>
-                </a:solidFill>
-                <a:miter lim="800000"/>
-                <a:headEnd/>
-                <a:tailEnd/>
-              </a14:hiddenLine>
-            </a:ext>
-          </a:extLst>
-        </p:spPr>
-      </p:pic>
-      <p:sp>
-        <p:nvSpPr>
-          <p:cNvPr id="13394" name="Text Box 57">
-            <a:extLst>
-              <a:ext uri="{FF2B5EF4-FFF2-40B4-BE49-F238E27FC236}">
-                <a16:creationId xmlns:a16="http://schemas.microsoft.com/office/drawing/2014/main" id="{CDE4C074-8507-4C4F-86DC-01888A842B3A}"/>
-              </a:ext>
-            </a:extLst>
-          </p:cNvPr>
-          <p:cNvSpPr txBox="1">
-            <a:spLocks noChangeArrowheads="1"/>
-          </p:cNvSpPr>
-          <p:nvPr/>
-        </p:nvSpPr>
-        <p:spPr bwMode="auto">
-          <a:xfrm>
-            <a:off x="20458198" y="22524163"/>
-            <a:ext cx="8971515" cy="418897"/>
-          </a:xfrm>
-          <a:prstGeom prst="rect">
-            <a:avLst/>
-          </a:prstGeom>
-          <a:noFill/>
-          <a:ln>
-            <a:noFill/>
-          </a:ln>
-          <a:extLst>
-            <a:ext uri="{909E8E84-426E-40DD-AFC4-6F175D3DCCD1}">
-              <a14:hiddenFill xmlns:a14="http://schemas.microsoft.com/office/drawing/2010/main">
-                <a:solidFill>
-                  <a:srgbClr val="FFFFFF"/>
-                </a:solidFill>
-              </a14:hiddenFill>
-            </a:ext>
-            <a:ext uri="{91240B29-F687-4F45-9708-019B960494DF}">
-              <a14:hiddenLine xmlns:a14="http://schemas.microsoft.com/office/drawing/2010/main" w="9525">
-                <a:solidFill>
-                  <a:srgbClr val="000000"/>
-                </a:solidFill>
-                <a:miter lim="800000"/>
-                <a:headEnd/>
-                <a:tailEnd/>
-              </a14:hiddenLine>
-            </a:ext>
-          </a:extLst>
-        </p:spPr>
-        <p:txBody>
-          <a:bodyPr>
-            <a:spAutoFit/>
-          </a:bodyPr>
-          <a:lstStyle>
-            <a:lvl1pPr eaLnBrk="0" hangingPunct="0">
-              <a:defRPr sz="2400">
-                <a:solidFill>
-                  <a:schemeClr val="tx1"/>
-                </a:solidFill>
-                <a:latin typeface="Times" pitchFamily="2" charset="0"/>
-                <a:ea typeface="ＭＳ Ｐゴシック" panose="020B0600070205080204" pitchFamily="34" charset="-128"/>
-              </a:defRPr>
-            </a:lvl1pPr>
-            <a:lvl2pPr marL="742950" indent="-285750" eaLnBrk="0" hangingPunct="0">
-              <a:defRPr sz="2400">
-                <a:solidFill>
-                  <a:schemeClr val="tx1"/>
-                </a:solidFill>
-                <a:latin typeface="Times" pitchFamily="2" charset="0"/>
-                <a:ea typeface="ＭＳ Ｐゴシック" panose="020B0600070205080204" pitchFamily="34" charset="-128"/>
-              </a:defRPr>
-            </a:lvl2pPr>
-            <a:lvl3pPr marL="1143000" indent="-228600" eaLnBrk="0" hangingPunct="0">
-              <a:defRPr sz="2400">
-                <a:solidFill>
-                  <a:schemeClr val="tx1"/>
-                </a:solidFill>
-                <a:latin typeface="Times" pitchFamily="2" charset="0"/>
-                <a:ea typeface="ＭＳ Ｐゴシック" panose="020B0600070205080204" pitchFamily="34" charset="-128"/>
-              </a:defRPr>
-            </a:lvl3pPr>
-            <a:lvl4pPr marL="1600200" indent="-228600" eaLnBrk="0" hangingPunct="0">
-              <a:defRPr sz="2400">
-                <a:solidFill>
-                  <a:schemeClr val="tx1"/>
-                </a:solidFill>
-                <a:latin typeface="Times" pitchFamily="2" charset="0"/>
-                <a:ea typeface="ＭＳ Ｐゴシック" panose="020B0600070205080204" pitchFamily="34" charset="-128"/>
-              </a:defRPr>
-            </a:lvl4pPr>
-            <a:lvl5pPr marL="2057400" indent="-228600" eaLnBrk="0" hangingPunct="0">
-              <a:defRPr sz="2400">
-                <a:solidFill>
-                  <a:schemeClr val="tx1"/>
-                </a:solidFill>
-                <a:latin typeface="Times" pitchFamily="2" charset="0"/>
-                <a:ea typeface="ＭＳ Ｐゴシック" panose="020B0600070205080204" pitchFamily="34" charset="-128"/>
-              </a:defRPr>
-            </a:lvl5pPr>
-            <a:lvl6pPr marL="2514600" indent="-228600" eaLnBrk="0" fontAlgn="base" hangingPunct="0">
-              <a:spcBef>
-                <a:spcPct val="0"/>
-              </a:spcBef>
-              <a:spcAft>
-                <a:spcPct val="0"/>
-              </a:spcAft>
-              <a:defRPr sz="2400">
-                <a:solidFill>
-                  <a:schemeClr val="tx1"/>
-                </a:solidFill>
-                <a:latin typeface="Times" pitchFamily="2" charset="0"/>
-                <a:ea typeface="ＭＳ Ｐゴシック" panose="020B0600070205080204" pitchFamily="34" charset="-128"/>
-              </a:defRPr>
-            </a:lvl6pPr>
-            <a:lvl7pPr marL="2971800" indent="-228600" eaLnBrk="0" fontAlgn="base" hangingPunct="0">
-              <a:spcBef>
-                <a:spcPct val="0"/>
-              </a:spcBef>
-              <a:spcAft>
-                <a:spcPct val="0"/>
-              </a:spcAft>
-              <a:defRPr sz="2400">
-                <a:solidFill>
-                  <a:schemeClr val="tx1"/>
-                </a:solidFill>
-                <a:latin typeface="Times" pitchFamily="2" charset="0"/>
-                <a:ea typeface="ＭＳ Ｐゴシック" panose="020B0600070205080204" pitchFamily="34" charset="-128"/>
-              </a:defRPr>
-            </a:lvl7pPr>
-            <a:lvl8pPr marL="3429000" indent="-228600" eaLnBrk="0" fontAlgn="base" hangingPunct="0">
-              <a:spcBef>
-                <a:spcPct val="0"/>
-              </a:spcBef>
-              <a:spcAft>
-                <a:spcPct val="0"/>
-              </a:spcAft>
-              <a:defRPr sz="2400">
-                <a:solidFill>
-                  <a:schemeClr val="tx1"/>
-                </a:solidFill>
-                <a:latin typeface="Times" pitchFamily="2" charset="0"/>
-                <a:ea typeface="ＭＳ Ｐゴシック" panose="020B0600070205080204" pitchFamily="34" charset="-128"/>
-              </a:defRPr>
-            </a:lvl8pPr>
-            <a:lvl9pPr marL="3886200" indent="-228600" eaLnBrk="0" fontAlgn="base" hangingPunct="0">
-              <a:spcBef>
-                <a:spcPct val="0"/>
-              </a:spcBef>
-              <a:spcAft>
-                <a:spcPct val="0"/>
-              </a:spcAft>
-              <a:defRPr sz="2400">
-                <a:solidFill>
-                  <a:schemeClr val="tx1"/>
-                </a:solidFill>
-                <a:latin typeface="Times" pitchFamily="2" charset="0"/>
-                <a:ea typeface="ＭＳ Ｐゴシック" panose="020B0600070205080204" pitchFamily="34" charset="-128"/>
-              </a:defRPr>
-            </a:lvl9pPr>
-          </a:lstStyle>
-          <a:p>
-            <a:pPr algn="just">
-              <a:spcBef>
-                <a:spcPct val="50000"/>
-              </a:spcBef>
-            </a:pPr>
-            <a:r>
-              <a:rPr lang="en-GB" altLang="en-US" sz="2122" b="1" dirty="0">
-                <a:solidFill>
-                  <a:srgbClr val="FF7F00"/>
-                </a:solidFill>
-                <a:latin typeface="Arial" panose="020B0604020202020204" pitchFamily="34" charset="0"/>
-              </a:rPr>
-              <a:t>2. Linear look ahead model</a:t>
-            </a:r>
-          </a:p>
-        </p:txBody>
-      </p:sp>
-      <p:pic>
-        <p:nvPicPr>
-          <p:cNvPr id="13395" name="Picture 2">
-            <a:extLst>
-              <a:ext uri="{FF2B5EF4-FFF2-40B4-BE49-F238E27FC236}">
-                <a16:creationId xmlns:a16="http://schemas.microsoft.com/office/drawing/2014/main" id="{69A8F26F-7DE0-BB48-ACAE-E93F97F19E24}"/>
-              </a:ext>
-            </a:extLst>
-          </p:cNvPr>
-          <p:cNvPicPr>
-            <a:picLocks noChangeAspect="1"/>
-          </p:cNvPicPr>
-          <p:nvPr/>
-        </p:nvPicPr>
-        <p:blipFill>
-          <a:blip r:embed="rId4">
-            <a:extLst>
-              <a:ext uri="{28A0092B-C50C-407E-A947-70E740481C1C}">
-                <a14:useLocalDpi xmlns:a14="http://schemas.microsoft.com/office/drawing/2010/main" val="0"/>
-              </a:ext>
-            </a:extLst>
-          </a:blip>
-          <a:srcRect/>
-          <a:stretch>
-            <a:fillRect/>
-          </a:stretch>
-        </p:blipFill>
-        <p:spPr bwMode="auto">
-          <a:xfrm>
-            <a:off x="20534552" y="22839682"/>
-            <a:ext cx="5330135" cy="2735245"/>
-          </a:xfrm>
-          <a:prstGeom prst="rect">
-            <a:avLst/>
-          </a:prstGeom>
-          <a:noFill/>
-          <a:ln>
-            <a:noFill/>
-          </a:ln>
-          <a:extLst>
-            <a:ext uri="{909E8E84-426E-40DD-AFC4-6F175D3DCCD1}">
-              <a14:hiddenFill xmlns:a14="http://schemas.microsoft.com/office/drawing/2010/main">
-                <a:solidFill>
-                  <a:srgbClr val="FFFFFF"/>
-                </a:solidFill>
-              </a14:hiddenFill>
-            </a:ext>
-            <a:ext uri="{91240B29-F687-4F45-9708-019B960494DF}">
-              <a14:hiddenLine xmlns:a14="http://schemas.microsoft.com/office/drawing/2010/main" w="9525">
-                <a:solidFill>
-                  <a:srgbClr val="000000"/>
-                </a:solidFill>
-                <a:miter lim="800000"/>
-                <a:headEnd/>
-                <a:tailEnd/>
-              </a14:hiddenLine>
-            </a:ext>
-          </a:extLst>
-        </p:spPr>
-      </p:pic>
-      <p:pic>
-        <p:nvPicPr>
-          <p:cNvPr id="13396" name="Picture 4">
-            <a:extLst>
-              <a:ext uri="{FF2B5EF4-FFF2-40B4-BE49-F238E27FC236}">
-                <a16:creationId xmlns:a16="http://schemas.microsoft.com/office/drawing/2014/main" id="{2E23BFE3-4FAB-ED45-9958-4B335E349771}"/>
-              </a:ext>
-            </a:extLst>
-          </p:cNvPr>
-          <p:cNvPicPr>
-            <a:picLocks noChangeAspect="1"/>
-          </p:cNvPicPr>
-          <p:nvPr/>
-        </p:nvPicPr>
-        <p:blipFill>
-          <a:blip r:embed="rId5">
-            <a:extLst>
-              <a:ext uri="{28A0092B-C50C-407E-A947-70E740481C1C}">
-                <a14:useLocalDpi xmlns:a14="http://schemas.microsoft.com/office/drawing/2010/main" val="0"/>
-              </a:ext>
-            </a:extLst>
-          </a:blip>
-          <a:srcRect/>
-          <a:stretch>
-            <a:fillRect/>
-          </a:stretch>
-        </p:blipFill>
-        <p:spPr bwMode="auto">
-          <a:xfrm>
-            <a:off x="26153256" y="23211343"/>
-            <a:ext cx="3166417" cy="1643842"/>
-          </a:xfrm>
-          <a:prstGeom prst="rect">
-            <a:avLst/>
-          </a:prstGeom>
-          <a:noFill/>
-          <a:ln>
-            <a:noFill/>
-          </a:ln>
-          <a:extLst>
-            <a:ext uri="{909E8E84-426E-40DD-AFC4-6F175D3DCCD1}">
-              <a14:hiddenFill xmlns:a14="http://schemas.microsoft.com/office/drawing/2010/main">
-                <a:solidFill>
-                  <a:srgbClr val="FFFFFF"/>
-                </a:solidFill>
-              </a14:hiddenFill>
-            </a:ext>
-            <a:ext uri="{91240B29-F687-4F45-9708-019B960494DF}">
-              <a14:hiddenLine xmlns:a14="http://schemas.microsoft.com/office/drawing/2010/main" w="9525">
-                <a:solidFill>
-                  <a:srgbClr val="000000"/>
-                </a:solidFill>
-                <a:miter lim="800000"/>
-                <a:headEnd/>
-                <a:tailEnd/>
-              </a14:hiddenLine>
-            </a:ext>
-          </a:extLst>
-        </p:spPr>
-      </p:pic>
-      <p:sp>
-        <p:nvSpPr>
-          <p:cNvPr id="13397" name="Text Box 57">
-            <a:extLst>
-              <a:ext uri="{FF2B5EF4-FFF2-40B4-BE49-F238E27FC236}">
-                <a16:creationId xmlns:a16="http://schemas.microsoft.com/office/drawing/2014/main" id="{623B9ED4-9AFC-1C43-BAE9-539C1DF47986}"/>
-              </a:ext>
-            </a:extLst>
-          </p:cNvPr>
-          <p:cNvSpPr txBox="1">
-            <a:spLocks noChangeArrowheads="1"/>
-          </p:cNvSpPr>
-          <p:nvPr/>
-        </p:nvSpPr>
-        <p:spPr bwMode="auto">
-          <a:xfrm>
-            <a:off x="20432373" y="25706300"/>
-            <a:ext cx="8912004" cy="2051716"/>
-          </a:xfrm>
-          <a:prstGeom prst="rect">
-            <a:avLst/>
-          </a:prstGeom>
-          <a:noFill/>
-          <a:ln>
-            <a:noFill/>
-          </a:ln>
-          <a:extLst>
-            <a:ext uri="{909E8E84-426E-40DD-AFC4-6F175D3DCCD1}">
-              <a14:hiddenFill xmlns:a14="http://schemas.microsoft.com/office/drawing/2010/main">
-                <a:solidFill>
-                  <a:srgbClr val="FFFFFF"/>
-                </a:solidFill>
-              </a14:hiddenFill>
-            </a:ext>
-            <a:ext uri="{91240B29-F687-4F45-9708-019B960494DF}">
-              <a14:hiddenLine xmlns:a14="http://schemas.microsoft.com/office/drawing/2010/main" w="9525">
-                <a:solidFill>
-                  <a:srgbClr val="000000"/>
-                </a:solidFill>
-                <a:miter lim="800000"/>
-                <a:headEnd/>
-                <a:tailEnd/>
-              </a14:hiddenLine>
-            </a:ext>
-          </a:extLst>
-        </p:spPr>
-        <p:txBody>
-          <a:bodyPr>
-            <a:spAutoFit/>
-          </a:bodyPr>
-          <a:lstStyle>
-            <a:lvl1pPr eaLnBrk="0" hangingPunct="0">
-              <a:defRPr sz="2400">
-                <a:solidFill>
-                  <a:schemeClr val="tx1"/>
-                </a:solidFill>
-                <a:latin typeface="Times" pitchFamily="2" charset="0"/>
-                <a:ea typeface="ＭＳ Ｐゴシック" panose="020B0600070205080204" pitchFamily="34" charset="-128"/>
-              </a:defRPr>
-            </a:lvl1pPr>
-            <a:lvl2pPr marL="742950" indent="-285750" eaLnBrk="0" hangingPunct="0">
-              <a:defRPr sz="2400">
-                <a:solidFill>
-                  <a:schemeClr val="tx1"/>
-                </a:solidFill>
-                <a:latin typeface="Times" pitchFamily="2" charset="0"/>
-                <a:ea typeface="ＭＳ Ｐゴシック" panose="020B0600070205080204" pitchFamily="34" charset="-128"/>
-              </a:defRPr>
-            </a:lvl2pPr>
-            <a:lvl3pPr marL="1143000" indent="-228600" eaLnBrk="0" hangingPunct="0">
-              <a:defRPr sz="2400">
-                <a:solidFill>
-                  <a:schemeClr val="tx1"/>
-                </a:solidFill>
-                <a:latin typeface="Times" pitchFamily="2" charset="0"/>
-                <a:ea typeface="ＭＳ Ｐゴシック" panose="020B0600070205080204" pitchFamily="34" charset="-128"/>
-              </a:defRPr>
-            </a:lvl3pPr>
-            <a:lvl4pPr marL="1600200" indent="-228600" eaLnBrk="0" hangingPunct="0">
-              <a:defRPr sz="2400">
-                <a:solidFill>
-                  <a:schemeClr val="tx1"/>
-                </a:solidFill>
-                <a:latin typeface="Times" pitchFamily="2" charset="0"/>
-                <a:ea typeface="ＭＳ Ｐゴシック" panose="020B0600070205080204" pitchFamily="34" charset="-128"/>
-              </a:defRPr>
-            </a:lvl4pPr>
-            <a:lvl5pPr marL="2057400" indent="-228600" eaLnBrk="0" hangingPunct="0">
-              <a:defRPr sz="2400">
-                <a:solidFill>
-                  <a:schemeClr val="tx1"/>
-                </a:solidFill>
-                <a:latin typeface="Times" pitchFamily="2" charset="0"/>
-                <a:ea typeface="ＭＳ Ｐゴシック" panose="020B0600070205080204" pitchFamily="34" charset="-128"/>
-              </a:defRPr>
-            </a:lvl5pPr>
-            <a:lvl6pPr marL="2514600" indent="-228600" eaLnBrk="0" fontAlgn="base" hangingPunct="0">
-              <a:spcBef>
-                <a:spcPct val="0"/>
-              </a:spcBef>
-              <a:spcAft>
-                <a:spcPct val="0"/>
-              </a:spcAft>
-              <a:defRPr sz="2400">
-                <a:solidFill>
-                  <a:schemeClr val="tx1"/>
-                </a:solidFill>
-                <a:latin typeface="Times" pitchFamily="2" charset="0"/>
-                <a:ea typeface="ＭＳ Ｐゴシック" panose="020B0600070205080204" pitchFamily="34" charset="-128"/>
-              </a:defRPr>
-            </a:lvl6pPr>
-            <a:lvl7pPr marL="2971800" indent="-228600" eaLnBrk="0" fontAlgn="base" hangingPunct="0">
-              <a:spcBef>
-                <a:spcPct val="0"/>
-              </a:spcBef>
-              <a:spcAft>
-                <a:spcPct val="0"/>
-              </a:spcAft>
-              <a:defRPr sz="2400">
-                <a:solidFill>
-                  <a:schemeClr val="tx1"/>
-                </a:solidFill>
-                <a:latin typeface="Times" pitchFamily="2" charset="0"/>
-                <a:ea typeface="ＭＳ Ｐゴシック" panose="020B0600070205080204" pitchFamily="34" charset="-128"/>
-              </a:defRPr>
-            </a:lvl7pPr>
-            <a:lvl8pPr marL="3429000" indent="-228600" eaLnBrk="0" fontAlgn="base" hangingPunct="0">
-              <a:spcBef>
-                <a:spcPct val="0"/>
-              </a:spcBef>
-              <a:spcAft>
-                <a:spcPct val="0"/>
-              </a:spcAft>
-              <a:defRPr sz="2400">
-                <a:solidFill>
-                  <a:schemeClr val="tx1"/>
-                </a:solidFill>
-                <a:latin typeface="Times" pitchFamily="2" charset="0"/>
-                <a:ea typeface="ＭＳ Ｐゴシック" panose="020B0600070205080204" pitchFamily="34" charset="-128"/>
-              </a:defRPr>
-            </a:lvl8pPr>
-            <a:lvl9pPr marL="3886200" indent="-228600" eaLnBrk="0" fontAlgn="base" hangingPunct="0">
-              <a:spcBef>
-                <a:spcPct val="0"/>
-              </a:spcBef>
-              <a:spcAft>
-                <a:spcPct val="0"/>
-              </a:spcAft>
-              <a:defRPr sz="2400">
-                <a:solidFill>
-                  <a:schemeClr val="tx1"/>
-                </a:solidFill>
-                <a:latin typeface="Times" pitchFamily="2" charset="0"/>
-                <a:ea typeface="ＭＳ Ｐゴシック" panose="020B0600070205080204" pitchFamily="34" charset="-128"/>
-              </a:defRPr>
-            </a:lvl9pPr>
-          </a:lstStyle>
-          <a:p>
-            <a:pPr algn="just">
-              <a:spcBef>
-                <a:spcPct val="50000"/>
-              </a:spcBef>
-            </a:pPr>
-            <a:r>
-              <a:rPr lang="en-GB" altLang="en-US" sz="2122">
-                <a:solidFill>
-                  <a:srgbClr val="000000"/>
-                </a:solidFill>
-                <a:latin typeface="Arial" panose="020B0604020202020204" pitchFamily="34" charset="0"/>
-              </a:rPr>
-              <a:t>Velocity input is decoupled from self-motion, the represented position sweeps away from </a:t>
-            </a:r>
-            <a:r>
-              <a:rPr lang="en-GB" altLang="en-US" sz="2122" i="1">
-                <a:solidFill>
-                  <a:srgbClr val="000000"/>
-                </a:solidFill>
-                <a:latin typeface="Arial" panose="020B0604020202020204" pitchFamily="34" charset="0"/>
-              </a:rPr>
-              <a:t>Start</a:t>
-            </a:r>
-            <a:r>
-              <a:rPr lang="en-GB" altLang="en-US" sz="2122" baseline="30000">
-                <a:solidFill>
-                  <a:srgbClr val="000000"/>
-                </a:solidFill>
-                <a:latin typeface="Arial" panose="020B0604020202020204" pitchFamily="34" charset="0"/>
-              </a:rPr>
-              <a:t>2</a:t>
-            </a:r>
-            <a:r>
-              <a:rPr lang="en-GB" altLang="en-US" sz="2122">
-                <a:solidFill>
-                  <a:srgbClr val="000000"/>
-                </a:solidFill>
-                <a:latin typeface="Arial" panose="020B0604020202020204" pitchFamily="34" charset="0"/>
-              </a:rPr>
-              <a:t>. The firing rate of a cell that integrates activity in the network encodes </a:t>
-            </a:r>
-            <a:r>
-              <a:rPr lang="en-GB" altLang="en-US" sz="2122" i="1">
-                <a:solidFill>
-                  <a:srgbClr val="000000"/>
-                </a:solidFill>
-                <a:latin typeface="Arial" panose="020B0604020202020204" pitchFamily="34" charset="0"/>
-              </a:rPr>
-              <a:t>dx</a:t>
-            </a:r>
-            <a:r>
-              <a:rPr lang="en-GB" altLang="en-US" sz="2122">
-                <a:solidFill>
-                  <a:srgbClr val="000000"/>
-                </a:solidFill>
-                <a:latin typeface="Arial" panose="020B0604020202020204" pitchFamily="34" charset="0"/>
-              </a:rPr>
-              <a:t> when grid cells representing </a:t>
-            </a:r>
-            <a:r>
-              <a:rPr lang="en-GB" altLang="en-US" sz="2122" i="1">
-                <a:solidFill>
-                  <a:srgbClr val="000000"/>
-                </a:solidFill>
-                <a:latin typeface="Arial" panose="020B0604020202020204" pitchFamily="34" charset="0"/>
-              </a:rPr>
-              <a:t>Goal</a:t>
-            </a:r>
-            <a:r>
-              <a:rPr lang="en-GB" altLang="en-US" sz="2122">
-                <a:solidFill>
-                  <a:srgbClr val="000000"/>
-                </a:solidFill>
-                <a:latin typeface="Arial" panose="020B0604020202020204" pitchFamily="34" charset="0"/>
-              </a:rPr>
-              <a:t> are simultaneously active in each module. 2D vectors are handled with sweeps along two non-collinear axes, in which grid cells that share a phase</a:t>
-            </a:r>
-            <a:r>
-              <a:rPr lang="en-GB" altLang="en-US" sz="2122" baseline="-25000">
-                <a:solidFill>
-                  <a:srgbClr val="000000"/>
-                </a:solidFill>
-                <a:latin typeface="Arial" panose="020B0604020202020204" pitchFamily="34" charset="0"/>
-              </a:rPr>
-              <a:t> </a:t>
-            </a:r>
-            <a:r>
-              <a:rPr lang="en-GB" altLang="en-US" sz="2122">
-                <a:solidFill>
-                  <a:srgbClr val="000000"/>
-                </a:solidFill>
-                <a:latin typeface="Arial" panose="020B0604020202020204" pitchFamily="34" charset="0"/>
-              </a:rPr>
-              <a:t>on each axis in each module are simultaneously active </a:t>
-            </a:r>
-          </a:p>
-        </p:txBody>
-      </p:sp>
-      <p:pic>
-        <p:nvPicPr>
-          <p:cNvPr id="13398" name="Picture 5">
-            <a:extLst>
-              <a:ext uri="{FF2B5EF4-FFF2-40B4-BE49-F238E27FC236}">
-                <a16:creationId xmlns:a16="http://schemas.microsoft.com/office/drawing/2014/main" id="{73475734-2DC9-2B48-A9C3-F61E1B9FFC66}"/>
-              </a:ext>
-            </a:extLst>
-          </p:cNvPr>
-          <p:cNvPicPr>
-            <a:picLocks noChangeAspect="1"/>
-          </p:cNvPicPr>
-          <p:nvPr/>
-        </p:nvPicPr>
-        <p:blipFill>
-          <a:blip r:embed="rId6">
-            <a:extLst>
-              <a:ext uri="{28A0092B-C50C-407E-A947-70E740481C1C}">
-                <a14:useLocalDpi xmlns:a14="http://schemas.microsoft.com/office/drawing/2010/main" val="0"/>
-              </a:ext>
-            </a:extLst>
-          </a:blip>
-          <a:srcRect/>
-          <a:stretch>
-            <a:fillRect/>
-          </a:stretch>
-        </p:blipFill>
-        <p:spPr bwMode="auto">
-          <a:xfrm>
-            <a:off x="20656941" y="15159436"/>
-            <a:ext cx="8848002" cy="3556044"/>
-          </a:xfrm>
-          <a:prstGeom prst="rect">
-            <a:avLst/>
-          </a:prstGeom>
-          <a:noFill/>
-          <a:ln>
-            <a:noFill/>
-          </a:ln>
-          <a:extLst>
-            <a:ext uri="{909E8E84-426E-40DD-AFC4-6F175D3DCCD1}">
-              <a14:hiddenFill xmlns:a14="http://schemas.microsoft.com/office/drawing/2010/main">
-                <a:solidFill>
-                  <a:srgbClr val="FFFFFF"/>
-                </a:solidFill>
-              </a14:hiddenFill>
-            </a:ext>
-            <a:ext uri="{91240B29-F687-4F45-9708-019B960494DF}">
-              <a14:hiddenLine xmlns:a14="http://schemas.microsoft.com/office/drawing/2010/main" w="9525">
-                <a:solidFill>
-                  <a:srgbClr val="000000"/>
-                </a:solidFill>
-                <a:miter lim="800000"/>
-                <a:headEnd/>
-                <a:tailEnd/>
-              </a14:hiddenLine>
-            </a:ext>
-          </a:extLst>
-        </p:spPr>
-      </p:pic>
+          </a:p>
+        </p:txBody>
+      </p:sp>
       <p:pic>
         <p:nvPicPr>
           <p:cNvPr id="2" name="Picture 1">
@@ -6612,7 +5265,7 @@
           <p:nvPr/>
         </p:nvPicPr>
         <p:blipFill>
-          <a:blip r:embed="rId7"/>
+          <a:blip r:embed="rId3"/>
           <a:stretch>
             <a:fillRect/>
           </a:stretch>
@@ -6642,7 +5295,7 @@
           <p:nvPr/>
         </p:nvPicPr>
         <p:blipFill>
-          <a:blip r:embed="rId8" cstate="hqprint">
+          <a:blip r:embed="rId4" cstate="hqprint">
             <a:extLst>
               <a:ext uri="{28A0092B-C50C-407E-A947-70E740481C1C}">
                 <a14:useLocalDpi xmlns:a14="http://schemas.microsoft.com/office/drawing/2010/main" val="0"/>
@@ -6678,7 +5331,7 @@
           <p:nvPr/>
         </p:nvPicPr>
         <p:blipFill>
-          <a:blip r:embed="rId9"/>
+          <a:blip r:embed="rId5"/>
           <a:stretch>
             <a:fillRect/>
           </a:stretch>
@@ -6708,7 +5361,7 @@
           <p:nvPr/>
         </p:nvPicPr>
         <p:blipFill rotWithShape="1">
-          <a:blip r:embed="rId10"/>
+          <a:blip r:embed="rId6"/>
           <a:srcRect t="15274" b="27034"/>
           <a:stretch/>
         </p:blipFill>
@@ -6736,8 +5389,8 @@
         </p:nvSpPr>
         <p:spPr bwMode="auto">
           <a:xfrm>
-            <a:off x="15807506" y="28095709"/>
-            <a:ext cx="13746073" cy="2814166"/>
+            <a:off x="15807506" y="28095708"/>
+            <a:ext cx="13746073" cy="12586683"/>
           </a:xfrm>
           <a:prstGeom prst="roundRect">
             <a:avLst>
@@ -6780,7 +5433,7 @@
           <p:nvPr/>
         </p:nvPicPr>
         <p:blipFill rotWithShape="1">
-          <a:blip r:embed="rId11">
+          <a:blip r:embed="rId7">
             <a:extLst>
               <a:ext uri="{28A0092B-C50C-407E-A947-70E740481C1C}">
                 <a14:useLocalDpi xmlns:a14="http://schemas.microsoft.com/office/drawing/2010/main" val="0"/>
@@ -6964,7 +5617,7 @@
               </a:spcBef>
             </a:pPr>
             <a:r>
-              <a:rPr lang="en-GB" altLang="en-US" sz="3000" b="1" dirty="0" smtClean="0">
+              <a:rPr lang="en-GB" altLang="en-US" sz="3000" b="1" dirty="0">
                 <a:solidFill>
                   <a:srgbClr val="FF7F00"/>
                 </a:solidFill>
@@ -6972,12 +5625,6 @@
               </a:rPr>
               <a:t>Simultaneous neural recordings</a:t>
             </a:r>
-            <a:endParaRPr lang="en-GB" altLang="en-US" sz="3000" b="1" dirty="0">
-              <a:solidFill>
-                <a:srgbClr val="FF7F00"/>
-              </a:solidFill>
-              <a:latin typeface="Arial" panose="020B0604020202020204" pitchFamily="34" charset="0"/>
-            </a:endParaRPr>
           </a:p>
         </p:txBody>
       </p:sp>
@@ -7053,7 +5700,7 @@
             <p:nvPr/>
           </p:nvPicPr>
           <p:blipFill rotWithShape="1">
-            <a:blip r:embed="rId11">
+            <a:blip r:embed="rId7">
               <a:extLst>
                 <a:ext uri="{28A0092B-C50C-407E-A947-70E740481C1C}">
                   <a14:useLocalDpi xmlns:a14="http://schemas.microsoft.com/office/drawing/2010/main" val="0"/>
@@ -7096,7 +5743,7 @@
             <a:lstStyle/>
             <a:p>
               <a:r>
-                <a:rPr lang="en-GB" sz="3000" dirty="0" smtClean="0">
+                <a:rPr lang="en-GB" sz="3000" dirty="0">
                   <a:solidFill>
                     <a:schemeClr val="bg1"/>
                   </a:solidFill>
@@ -7105,13 +5752,6 @@
                 </a:rPr>
                 <a:t>CA1</a:t>
               </a:r>
-              <a:endParaRPr lang="en-GB" sz="3000" dirty="0">
-                <a:solidFill>
-                  <a:schemeClr val="bg1"/>
-                </a:solidFill>
-                <a:latin typeface="Arial" panose="020B0604020202020204" pitchFamily="34" charset="0"/>
-                <a:cs typeface="Arial" panose="020B0604020202020204" pitchFamily="34" charset="0"/>
-              </a:endParaRPr>
             </a:p>
           </p:txBody>
         </p:sp>
@@ -7125,7 +5765,7 @@
           <p:nvPr/>
         </p:nvPicPr>
         <p:blipFill rotWithShape="1">
-          <a:blip r:embed="rId11">
+          <a:blip r:embed="rId7">
             <a:extLst>
               <a:ext uri="{28A0092B-C50C-407E-A947-70E740481C1C}">
                 <a14:useLocalDpi xmlns:a14="http://schemas.microsoft.com/office/drawing/2010/main" val="0"/>
@@ -7168,7 +5808,7 @@
           <a:p>
             <a:pPr algn="r"/>
             <a:r>
-              <a:rPr lang="en-GB" altLang="en-US" sz="3200" dirty="0" smtClean="0">
+              <a:rPr lang="en-GB" altLang="en-US" sz="3200" dirty="0">
                 <a:solidFill>
                   <a:schemeClr val="bg2">
                     <a:lumMod val="75000"/>
@@ -7182,7 +5822,7 @@
           <a:p>
             <a:pPr algn="r"/>
             <a:r>
-              <a:rPr lang="en-GB" sz="3200" dirty="0" smtClean="0">
+              <a:rPr lang="en-GB" sz="3200" dirty="0">
                 <a:solidFill>
                   <a:schemeClr val="bg2">
                     <a:lumMod val="75000"/>
@@ -7196,7 +5836,7 @@
           <a:p>
             <a:pPr algn="ctr"/>
             <a:r>
-              <a:rPr lang="en-GB" sz="3200" dirty="0" smtClean="0">
+              <a:rPr lang="en-GB" sz="3200" dirty="0">
                 <a:solidFill>
                   <a:schemeClr val="bg2">
                     <a:lumMod val="75000"/>
@@ -7238,7 +5878,7 @@
           <a:lstStyle/>
           <a:p>
             <a:r>
-              <a:rPr lang="en-GB" altLang="en-US" sz="3000" dirty="0" smtClean="0">
+              <a:rPr lang="en-GB" altLang="en-US" sz="3000" dirty="0">
                 <a:latin typeface="Arial" panose="020B0604020202020204" pitchFamily="34" charset="0"/>
               </a:rPr>
               <a:t>GCaMP signals in hippocampus CA1</a:t>
@@ -7246,13 +5886,13 @@
           </a:p>
           <a:p>
             <a:r>
-              <a:rPr lang="en-GB" altLang="en-US" sz="3000" dirty="0" smtClean="0">
+              <a:rPr lang="en-GB" altLang="en-US" sz="3000" dirty="0">
                 <a:latin typeface="Arial" panose="020B0604020202020204" pitchFamily="34" charset="0"/>
               </a:rPr>
               <a:t>Multi-unit spiking activities in the lateral septum (LS) and neocortex, smoothened at 330 </a:t>
             </a:r>
             <a:r>
-              <a:rPr lang="en-GB" altLang="en-US" sz="3000" dirty="0" err="1" smtClean="0">
+              <a:rPr lang="en-GB" altLang="en-US" sz="3000" dirty="0" err="1">
                 <a:latin typeface="Arial" panose="020B0604020202020204" pitchFamily="34" charset="0"/>
               </a:rPr>
               <a:t>ms</a:t>
@@ -7270,7 +5910,7 @@
           <p:nvPr/>
         </p:nvPicPr>
         <p:blipFill>
-          <a:blip r:embed="rId12" cstate="print">
+          <a:blip r:embed="rId8" cstate="print">
             <a:extLst>
               <a:ext uri="{28A0092B-C50C-407E-A947-70E740481C1C}">
                 <a14:useLocalDpi xmlns:a14="http://schemas.microsoft.com/office/drawing/2010/main" val="0"/>
@@ -7318,7 +5958,7 @@
               </a:spcBef>
             </a:pPr>
             <a:r>
-              <a:rPr lang="en-GB" altLang="en-US" sz="3000" b="1" dirty="0" smtClean="0">
+              <a:rPr lang="en-GB" altLang="en-US" sz="3000" b="1" dirty="0">
                 <a:solidFill>
                   <a:srgbClr val="FF7F00"/>
                 </a:solidFill>
@@ -7326,12 +5966,6 @@
               </a:rPr>
               <a:t>Transformer learns endogenous activities</a:t>
             </a:r>
-            <a:endParaRPr lang="en-GB" altLang="en-US" sz="3000" b="1" dirty="0">
-              <a:solidFill>
-                <a:srgbClr val="FF7F00"/>
-              </a:solidFill>
-              <a:latin typeface="Arial" panose="020B0604020202020204" pitchFamily="34" charset="0"/>
-            </a:endParaRPr>
           </a:p>
         </p:txBody>
       </p:sp>
@@ -7362,7 +5996,7 @@
               </a:spcBef>
             </a:pPr>
             <a:r>
-              <a:rPr lang="en-GB" altLang="en-US" sz="3000" b="1" dirty="0" smtClean="0">
+              <a:rPr lang="en-GB" altLang="en-US" sz="3000" b="1" dirty="0">
                 <a:solidFill>
                   <a:srgbClr val="FF7F00"/>
                 </a:solidFill>
@@ -7370,12 +6004,6 @@
               </a:rPr>
               <a:t>Stimuli injection</a:t>
             </a:r>
-            <a:endParaRPr lang="en-GB" altLang="en-US" sz="3000" b="1" dirty="0">
-              <a:solidFill>
-                <a:srgbClr val="FF7F00"/>
-              </a:solidFill>
-              <a:latin typeface="Arial" panose="020B0604020202020204" pitchFamily="34" charset="0"/>
-            </a:endParaRPr>
           </a:p>
         </p:txBody>
       </p:sp>
@@ -7387,7 +6015,7 @@
         </p:nvGrpSpPr>
         <p:grpSpPr>
           <a:xfrm>
-            <a:off x="5411031" y="16341814"/>
+            <a:off x="3403068" y="16845090"/>
             <a:ext cx="9896475" cy="8591550"/>
             <a:chOff x="1066312" y="16263635"/>
             <a:chExt cx="9896475" cy="8591550"/>
@@ -7402,7 +6030,7 @@
             <p:nvPr/>
           </p:nvPicPr>
           <p:blipFill>
-            <a:blip r:embed="rId13"/>
+            <a:blip r:embed="rId9"/>
             <a:stretch>
               <a:fillRect/>
             </a:stretch>
@@ -7455,7 +6083,7 @@
               <a:p>
                 <a:pPr algn="ctr"/>
                 <a:r>
-                  <a:rPr lang="en-GB" sz="3000" dirty="0" smtClean="0">
+                  <a:rPr lang="en-GB" sz="3000" dirty="0">
                     <a:latin typeface="Arial" panose="020B0604020202020204" pitchFamily="34" charset="0"/>
                     <a:cs typeface="Arial" panose="020B0604020202020204" pitchFamily="34" charset="0"/>
                   </a:rPr>
@@ -7465,16 +6093,12 @@
               <a:p>
                 <a:pPr algn="ctr"/>
                 <a:r>
-                  <a:rPr lang="en-GB" sz="3000" dirty="0" smtClean="0">
+                  <a:rPr lang="en-GB" sz="3000" dirty="0">
                     <a:latin typeface="Arial" panose="020B0604020202020204" pitchFamily="34" charset="0"/>
                     <a:cs typeface="Arial" panose="020B0604020202020204" pitchFamily="34" charset="0"/>
                   </a:rPr>
                   <a:t>signals</a:t>
                 </a:r>
-                <a:endParaRPr lang="en-GB" sz="3000" dirty="0">
-                  <a:latin typeface="Arial" panose="020B0604020202020204" pitchFamily="34" charset="0"/>
-                  <a:cs typeface="Arial" panose="020B0604020202020204" pitchFamily="34" charset="0"/>
-                </a:endParaRPr>
               </a:p>
             </p:txBody>
           </p:sp>
@@ -7502,7 +6126,7 @@
               <a:p>
                 <a:pPr algn="ctr"/>
                 <a:r>
-                  <a:rPr lang="en-GB" sz="3000" dirty="0" smtClean="0">
+                  <a:rPr lang="en-GB" sz="3000" dirty="0">
                     <a:latin typeface="Arial" panose="020B0604020202020204" pitchFamily="34" charset="0"/>
                     <a:cs typeface="Arial" panose="020B0604020202020204" pitchFamily="34" charset="0"/>
                   </a:rPr>
@@ -7512,16 +6136,12 @@
               <a:p>
                 <a:pPr algn="ctr"/>
                 <a:r>
-                  <a:rPr lang="en-GB" sz="3000" dirty="0" smtClean="0">
+                  <a:rPr lang="en-GB" sz="3000" dirty="0">
                     <a:latin typeface="Arial" panose="020B0604020202020204" pitchFamily="34" charset="0"/>
                     <a:cs typeface="Arial" panose="020B0604020202020204" pitchFamily="34" charset="0"/>
                   </a:rPr>
                   <a:t>Encoder</a:t>
                 </a:r>
-                <a:endParaRPr lang="en-GB" sz="3000" dirty="0">
-                  <a:latin typeface="Arial" panose="020B0604020202020204" pitchFamily="34" charset="0"/>
-                  <a:cs typeface="Arial" panose="020B0604020202020204" pitchFamily="34" charset="0"/>
-                </a:endParaRPr>
               </a:p>
             </p:txBody>
           </p:sp>
@@ -7549,7 +6169,7 @@
               <a:p>
                 <a:pPr algn="ctr"/>
                 <a:r>
-                  <a:rPr lang="en-GB" sz="3000" dirty="0" smtClean="0">
+                  <a:rPr lang="en-GB" sz="3000" dirty="0">
                     <a:latin typeface="Arial" panose="020B0604020202020204" pitchFamily="34" charset="0"/>
                     <a:cs typeface="Arial" panose="020B0604020202020204" pitchFamily="34" charset="0"/>
                   </a:rPr>
@@ -7559,16 +6179,12 @@
               <a:p>
                 <a:pPr algn="ctr"/>
                 <a:r>
-                  <a:rPr lang="en-GB" sz="3000" dirty="0" smtClean="0">
+                  <a:rPr lang="en-GB" sz="3000" dirty="0">
                     <a:latin typeface="Arial" panose="020B0604020202020204" pitchFamily="34" charset="0"/>
                     <a:cs typeface="Arial" panose="020B0604020202020204" pitchFamily="34" charset="0"/>
                   </a:rPr>
                   <a:t>spiking rates</a:t>
                 </a:r>
-                <a:endParaRPr lang="en-GB" sz="3000" dirty="0">
-                  <a:latin typeface="Arial" panose="020B0604020202020204" pitchFamily="34" charset="0"/>
-                  <a:cs typeface="Arial" panose="020B0604020202020204" pitchFamily="34" charset="0"/>
-                </a:endParaRPr>
               </a:p>
             </p:txBody>
           </p:sp>
@@ -7576,14 +6192,20 @@
       </p:grpSp>
       <p:pic>
         <p:nvPicPr>
-          <p:cNvPr id="29" name="Picture 28"/>
+          <p:cNvPr id="6" name="Picture 5" descr="A graph of different colored bars&#10;&#10;Description automatically generated">
+            <a:extLst>
+              <a:ext uri="{FF2B5EF4-FFF2-40B4-BE49-F238E27FC236}">
+                <a16:creationId xmlns:a16="http://schemas.microsoft.com/office/drawing/2014/main" id="{51C4A2A7-5F51-8124-D01A-543D28B86A70}"/>
+              </a:ext>
+            </a:extLst>
+          </p:cNvPr>
           <p:cNvPicPr>
             <a:picLocks noChangeAspect="1"/>
           </p:cNvPicPr>
           <p:nvPr/>
         </p:nvPicPr>
         <p:blipFill>
-          <a:blip r:embed="rId14" cstate="print">
+          <a:blip r:embed="rId10">
             <a:extLst>
               <a:ext uri="{28A0092B-C50C-407E-A947-70E740481C1C}">
                 <a14:useLocalDpi xmlns:a14="http://schemas.microsoft.com/office/drawing/2010/main" val="0"/>
@@ -7596,8 +6218,43 @@
         </p:blipFill>
         <p:spPr>
           <a:xfrm>
-            <a:off x="1023304" y="27944503"/>
-            <a:ext cx="11503976" cy="6118928"/>
+            <a:off x="3708716" y="28219044"/>
+            <a:ext cx="8692044" cy="4363809"/>
+          </a:xfrm>
+          <a:prstGeom prst="rect">
+            <a:avLst/>
+          </a:prstGeom>
+        </p:spPr>
+      </p:pic>
+      <p:pic>
+        <p:nvPicPr>
+          <p:cNvPr id="11" name="Picture 10" descr="A diagram of different colors&#10;&#10;Description automatically generated">
+            <a:extLst>
+              <a:ext uri="{FF2B5EF4-FFF2-40B4-BE49-F238E27FC236}">
+                <a16:creationId xmlns:a16="http://schemas.microsoft.com/office/drawing/2014/main" id="{FBFC13BC-3129-F290-0702-B3DCAF6F5F92}"/>
+              </a:ext>
+            </a:extLst>
+          </p:cNvPr>
+          <p:cNvPicPr>
+            <a:picLocks noChangeAspect="1"/>
+          </p:cNvPicPr>
+          <p:nvPr/>
+        </p:nvPicPr>
+        <p:blipFill rotWithShape="1">
+          <a:blip r:embed="rId11">
+            <a:extLst>
+              <a:ext uri="{28A0092B-C50C-407E-A947-70E740481C1C}">
+                <a14:useLocalDpi xmlns:a14="http://schemas.microsoft.com/office/drawing/2010/main" val="0"/>
+              </a:ext>
+            </a:extLst>
+          </a:blip>
+          <a:srcRect l="44018" r="1"/>
+          <a:stretch/>
+        </p:blipFill>
+        <p:spPr>
+          <a:xfrm>
+            <a:off x="16017241" y="7239787"/>
+            <a:ext cx="8752553" cy="5297204"/>
           </a:xfrm>
           <a:prstGeom prst="rect">
             <a:avLst/>
@@ -7609,13 +6266,6 @@
   <p:clrMapOvr>
     <a:masterClrMapping/>
   </p:clrMapOvr>
-  <p:timing>
-    <p:tnLst>
-      <p:par>
-        <p:cTn id="1" dur="indefinite" restart="never" nodeType="tmRoot"/>
-      </p:par>
-    </p:tnLst>
-  </p:timing>
 </p:sld>
 </file>
 

</xml_diff>